<commit_message>
Deploy hytechclub/cs-102 to github.com/hytechclub/cs-102.git:gh-pages
</commit_message>
<xml_diff>
--- a/Collections/Collections.pptx
+++ b/Collections/Collections.pptx
@@ -217,7 +217,7 @@
           <a:p>
             <a:fld id="{19104133-B5B0-4351-8158-4F0E5EB1E2BF}" type="datetimeFigureOut">
               <a:rPr lang="en-US" smtClean="0"/>
-              <a:t>2/25/2020</a:t>
+              <a:t>10/12/2020</a:t>
             </a:fld>
             <a:endParaRPr lang="en-US"/>
           </a:p>
@@ -1246,23 +1246,11 @@
           <a:p>
             <a:r>
               <a:rPr lang="en-US" baseline="0" dirty="0" smtClean="0"/>
-              <a:t>turtles[1</a:t>
-            </a:r>
-            <a:r>
-              <a:rPr lang="en-US" baseline="0" dirty="0" smtClean="0"/>
-              <a:t>] </a:t>
-            </a:r>
-            <a:r>
-              <a:rPr lang="en-US" baseline="0" dirty="0" smtClean="0"/>
-              <a:t>is </a:t>
+              <a:t>turtles[1] is </a:t>
             </a:r>
             <a:r>
               <a:rPr lang="en-US" b="1" baseline="0" dirty="0" smtClean="0"/>
-              <a:t>“Donatello</a:t>
-            </a:r>
-            <a:r>
-              <a:rPr lang="en-US" b="1" baseline="0" dirty="0" smtClean="0"/>
-              <a:t>”</a:t>
+              <a:t>“Donatello”</a:t>
             </a:r>
           </a:p>
           <a:p>
@@ -1386,23 +1374,7 @@
           <a:p>
             <a:r>
               <a:rPr lang="en-US" dirty="0" smtClean="0"/>
-              <a:t>Walk </a:t>
-            </a:r>
-            <a:r>
-              <a:rPr lang="en-US" dirty="0" smtClean="0"/>
-              <a:t>through each </a:t>
-            </a:r>
-            <a:r>
-              <a:rPr lang="en-US" dirty="0" smtClean="0"/>
-              <a:t>new line </a:t>
-            </a:r>
-            <a:r>
-              <a:rPr lang="en-US" dirty="0" smtClean="0"/>
-              <a:t>of code, and update the whiteboard list. </a:t>
-            </a:r>
-            <a:r>
-              <a:rPr lang="en-US" dirty="0" smtClean="0"/>
-              <a:t>Add an item to the end, update the 2</a:t>
+              <a:t>Walk through each new line of code, and update the whiteboard list. Add an item to the end, update the 2</a:t>
             </a:r>
             <a:r>
               <a:rPr lang="en-US" baseline="30000" dirty="0" smtClean="0"/>
@@ -1460,7 +1432,6 @@
               <a:rPr lang="en-US" dirty="0" smtClean="0"/>
               <a:t>Michelangelo</a:t>
             </a:r>
-            <a:endParaRPr lang="en-US" dirty="0" smtClean="0"/>
           </a:p>
           <a:p>
             <a:endParaRPr lang="en-US" dirty="0" smtClean="0"/>
@@ -2263,7 +2234,7 @@
             <a:fld id="{1C2D31DE-C454-491C-B5C3-F097855E3DF7}" type="datetime4">
               <a:rPr lang="en-US" smtClean="0"/>
               <a:pPr/>
-              <a:t>February 25, 2020</a:t>
+              <a:t>October 12, 2020</a:t>
             </a:fld>
             <a:endParaRPr lang="en-US" dirty="0"/>
           </a:p>
@@ -5663,7 +5634,7 @@
           <a:p>
             <a:fld id="{5958763E-B898-436D-883D-03711491D54A}" type="datetimeFigureOut">
               <a:rPr lang="en-US" smtClean="0"/>
-              <a:t>2/25/2020</a:t>
+              <a:t>10/12/2020</a:t>
             </a:fld>
             <a:endParaRPr lang="en-US"/>
           </a:p>
@@ -5864,7 +5835,7 @@
           <a:p>
             <a:fld id="{5958763E-B898-436D-883D-03711491D54A}" type="datetimeFigureOut">
               <a:rPr lang="en-US" smtClean="0"/>
-              <a:t>2/25/2020</a:t>
+              <a:t>10/12/2020</a:t>
             </a:fld>
             <a:endParaRPr lang="en-US"/>
           </a:p>
@@ -6121,7 +6092,7 @@
           <a:p>
             <a:fld id="{5958763E-B898-436D-883D-03711491D54A}" type="datetimeFigureOut">
               <a:rPr lang="en-US" smtClean="0"/>
-              <a:t>2/25/2020</a:t>
+              <a:t>10/12/2020</a:t>
             </a:fld>
             <a:endParaRPr lang="en-US"/>
           </a:p>
@@ -6476,7 +6447,7 @@
           <a:p>
             <a:fld id="{5958763E-B898-436D-883D-03711491D54A}" type="datetimeFigureOut">
               <a:rPr lang="en-US" smtClean="0"/>
-              <a:t>2/25/2020</a:t>
+              <a:t>10/12/2020</a:t>
             </a:fld>
             <a:endParaRPr lang="en-US"/>
           </a:p>
@@ -6899,7 +6870,7 @@
           <a:p>
             <a:fld id="{5958763E-B898-436D-883D-03711491D54A}" type="datetimeFigureOut">
               <a:rPr lang="en-US" smtClean="0"/>
-              <a:t>2/25/2020</a:t>
+              <a:t>10/12/2020</a:t>
             </a:fld>
             <a:endParaRPr lang="en-US"/>
           </a:p>
@@ -7407,7 +7378,7 @@
           <a:p>
             <a:fld id="{5958763E-B898-436D-883D-03711491D54A}" type="datetimeFigureOut">
               <a:rPr lang="en-US" smtClean="0"/>
-              <a:t>2/25/2020</a:t>
+              <a:t>10/12/2020</a:t>
             </a:fld>
             <a:endParaRPr lang="en-US"/>
           </a:p>
@@ -7865,7 +7836,7 @@
           <a:p>
             <a:fld id="{5958763E-B898-436D-883D-03711491D54A}" type="datetimeFigureOut">
               <a:rPr lang="en-US" smtClean="0"/>
-              <a:t>2/25/2020</a:t>
+              <a:t>10/12/2020</a:t>
             </a:fld>
             <a:endParaRPr lang="en-US"/>
           </a:p>
@@ -8483,7 +8454,7 @@
           <a:p>
             <a:fld id="{5958763E-B898-436D-883D-03711491D54A}" type="datetimeFigureOut">
               <a:rPr lang="en-US" smtClean="0"/>
-              <a:t>2/25/2020</a:t>
+              <a:t>10/12/2020</a:t>
             </a:fld>
             <a:endParaRPr lang="en-US"/>
           </a:p>
@@ -9261,7 +9232,7 @@
           <a:p>
             <a:fld id="{5958763E-B898-436D-883D-03711491D54A}" type="datetimeFigureOut">
               <a:rPr lang="en-US" smtClean="0"/>
-              <a:t>2/25/2020</a:t>
+              <a:t>10/12/2020</a:t>
             </a:fld>
             <a:endParaRPr lang="en-US"/>
           </a:p>
@@ -9372,7 +9343,7 @@
           <a:p>
             <a:fld id="{5958763E-B898-436D-883D-03711491D54A}" type="datetimeFigureOut">
               <a:rPr lang="en-US" smtClean="0"/>
-              <a:t>2/25/2020</a:t>
+              <a:t>10/12/2020</a:t>
             </a:fld>
             <a:endParaRPr lang="en-US"/>
           </a:p>
@@ -9714,7 +9685,7 @@
             <a:fld id="{1C2D31DE-C454-491C-B5C3-F097855E3DF7}" type="datetime4">
               <a:rPr lang="en-US" smtClean="0"/>
               <a:pPr/>
-              <a:t>February 25, 2020</a:t>
+              <a:t>October 12, 2020</a:t>
             </a:fld>
             <a:endParaRPr lang="en-US" dirty="0"/>
           </a:p>
@@ -12874,7 +12845,7 @@
           <a:p>
             <a:fld id="{5958763E-B898-436D-883D-03711491D54A}" type="datetimeFigureOut">
               <a:rPr lang="en-US" smtClean="0"/>
-              <a:t>2/25/2020</a:t>
+              <a:t>10/12/2020</a:t>
             </a:fld>
             <a:endParaRPr lang="en-US"/>
           </a:p>
@@ -13005,7 +12976,7 @@
           <a:p>
             <a:fld id="{5958763E-B898-436D-883D-03711491D54A}" type="datetimeFigureOut">
               <a:rPr lang="en-US" smtClean="0"/>
-              <a:t>2/25/2020</a:t>
+              <a:t>10/12/2020</a:t>
             </a:fld>
             <a:endParaRPr lang="en-US"/>
           </a:p>
@@ -13136,7 +13107,7 @@
           <a:p>
             <a:fld id="{5958763E-B898-436D-883D-03711491D54A}" type="datetimeFigureOut">
               <a:rPr lang="en-US" smtClean="0"/>
-              <a:t>2/25/2020</a:t>
+              <a:t>10/12/2020</a:t>
             </a:fld>
             <a:endParaRPr lang="en-US"/>
           </a:p>
@@ -13267,7 +13238,7 @@
           <a:p>
             <a:fld id="{5958763E-B898-436D-883D-03711491D54A}" type="datetimeFigureOut">
               <a:rPr lang="en-US" smtClean="0"/>
-              <a:t>2/25/2020</a:t>
+              <a:t>10/12/2020</a:t>
             </a:fld>
             <a:endParaRPr lang="en-US"/>
           </a:p>
@@ -13398,7 +13369,7 @@
           <a:p>
             <a:fld id="{5958763E-B898-436D-883D-03711491D54A}" type="datetimeFigureOut">
               <a:rPr lang="en-US" smtClean="0"/>
-              <a:t>2/25/2020</a:t>
+              <a:t>10/12/2020</a:t>
             </a:fld>
             <a:endParaRPr lang="en-US"/>
           </a:p>
@@ -13529,7 +13500,7 @@
           <a:p>
             <a:fld id="{5958763E-B898-436D-883D-03711491D54A}" type="datetimeFigureOut">
               <a:rPr lang="en-US" smtClean="0"/>
-              <a:t>2/25/2020</a:t>
+              <a:t>10/12/2020</a:t>
             </a:fld>
             <a:endParaRPr lang="en-US"/>
           </a:p>
@@ -13660,7 +13631,7 @@
           <a:p>
             <a:fld id="{5958763E-B898-436D-883D-03711491D54A}" type="datetimeFigureOut">
               <a:rPr lang="en-US" smtClean="0"/>
-              <a:t>2/25/2020</a:t>
+              <a:t>10/12/2020</a:t>
             </a:fld>
             <a:endParaRPr lang="en-US"/>
           </a:p>
@@ -13791,7 +13762,7 @@
           <a:p>
             <a:fld id="{5958763E-B898-436D-883D-03711491D54A}" type="datetimeFigureOut">
               <a:rPr lang="en-US" smtClean="0"/>
-              <a:t>2/25/2020</a:t>
+              <a:t>10/12/2020</a:t>
             </a:fld>
             <a:endParaRPr lang="en-US"/>
           </a:p>
@@ -13931,7 +13902,7 @@
           <a:p>
             <a:fld id="{5958763E-B898-436D-883D-03711491D54A}" type="datetimeFigureOut">
               <a:rPr lang="en-US" smtClean="0"/>
-              <a:t>2/25/2020</a:t>
+              <a:t>10/12/2020</a:t>
             </a:fld>
             <a:endParaRPr lang="en-US"/>
           </a:p>
@@ -17292,7 +17263,7 @@
             <a:fld id="{1C2D31DE-C454-491C-B5C3-F097855E3DF7}" type="datetime4">
               <a:rPr lang="en-US" smtClean="0"/>
               <a:pPr/>
-              <a:t>February 25, 2020</a:t>
+              <a:t>October 12, 2020</a:t>
             </a:fld>
             <a:endParaRPr lang="en-US" dirty="0"/>
           </a:p>
@@ -29537,7 +29508,7 @@
           <a:p>
             <a:fld id="{5958763E-B898-436D-883D-03711491D54A}" type="datetimeFigureOut">
               <a:rPr lang="en-US" smtClean="0"/>
-              <a:t>2/25/2020</a:t>
+              <a:t>10/12/2020</a:t>
             </a:fld>
             <a:endParaRPr lang="en-US"/>
           </a:p>
@@ -29946,7 +29917,7 @@
           <a:p>
             <a:fld id="{5958763E-B898-436D-883D-03711491D54A}" type="datetimeFigureOut">
               <a:rPr lang="en-US" smtClean="0"/>
-              <a:t>2/25/2020</a:t>
+              <a:t>10/12/2020</a:t>
             </a:fld>
             <a:endParaRPr lang="en-US"/>
           </a:p>
@@ -30247,7 +30218,7 @@
           <a:p>
             <a:fld id="{5958763E-B898-436D-883D-03711491D54A}" type="datetimeFigureOut">
               <a:rPr lang="en-US" smtClean="0"/>
-              <a:t>2/25/2020</a:t>
+              <a:t>10/12/2020</a:t>
             </a:fld>
             <a:endParaRPr lang="en-US"/>
           </a:p>
@@ -30455,7 +30426,7 @@
           <a:p>
             <a:fld id="{5958763E-B898-436D-883D-03711491D54A}" type="datetimeFigureOut">
               <a:rPr lang="en-US" smtClean="0"/>
-              <a:t>2/25/2020</a:t>
+              <a:t>10/12/2020</a:t>
             </a:fld>
             <a:endParaRPr lang="en-US"/>
           </a:p>
@@ -30723,7 +30694,7 @@
           <a:p>
             <a:fld id="{5958763E-B898-436D-883D-03711491D54A}" type="datetimeFigureOut">
               <a:rPr lang="en-US" smtClean="0"/>
-              <a:t>2/25/2020</a:t>
+              <a:t>10/12/2020</a:t>
             </a:fld>
             <a:endParaRPr lang="en-US"/>
           </a:p>
@@ -31240,7 +31211,7 @@
           <a:p>
             <a:fld id="{5958763E-B898-436D-883D-03711491D54A}" type="datetimeFigureOut">
               <a:rPr lang="en-US" smtClean="0"/>
-              <a:t>2/25/2020</a:t>
+              <a:t>10/12/2020</a:t>
             </a:fld>
             <a:endParaRPr lang="en-US"/>
           </a:p>
@@ -31728,7 +31699,7 @@
           <a:p>
             <a:fld id="{5958763E-B898-436D-883D-03711491D54A}" type="datetimeFigureOut">
               <a:rPr lang="en-US" smtClean="0"/>
-              <a:t>2/25/2020</a:t>
+              <a:t>10/12/2020</a:t>
             </a:fld>
             <a:endParaRPr lang="en-US"/>
           </a:p>
@@ -32554,7 +32525,7 @@
           <a:p>
             <a:fld id="{5958763E-B898-436D-883D-03711491D54A}" type="datetimeFigureOut">
               <a:rPr lang="en-US" smtClean="0"/>
-              <a:t>2/25/2020</a:t>
+              <a:t>10/12/2020</a:t>
             </a:fld>
             <a:endParaRPr lang="en-US"/>
           </a:p>
@@ -32762,7 +32733,7 @@
           <a:p>
             <a:fld id="{5958763E-B898-436D-883D-03711491D54A}" type="datetimeFigureOut">
               <a:rPr lang="en-US" smtClean="0"/>
-              <a:t>2/25/2020</a:t>
+              <a:t>10/12/2020</a:t>
             </a:fld>
             <a:endParaRPr lang="en-US"/>
           </a:p>
@@ -33104,7 +33075,7 @@
           <a:p>
             <a:fld id="{5958763E-B898-436D-883D-03711491D54A}" type="datetimeFigureOut">
               <a:rPr lang="en-US" smtClean="0"/>
-              <a:t>2/25/2020</a:t>
+              <a:t>10/12/2020</a:t>
             </a:fld>
             <a:endParaRPr lang="en-US"/>
           </a:p>
@@ -33341,7 +33312,7 @@
           <a:p>
             <a:fld id="{5958763E-B898-436D-883D-03711491D54A}" type="datetimeFigureOut">
               <a:rPr lang="en-US" smtClean="0"/>
-              <a:t>2/25/2020</a:t>
+              <a:t>10/12/2020</a:t>
             </a:fld>
             <a:endParaRPr lang="en-US"/>
           </a:p>
@@ -33592,7 +33563,7 @@
           <a:p>
             <a:fld id="{5958763E-B898-436D-883D-03711491D54A}" type="datetimeFigureOut">
               <a:rPr lang="en-US" smtClean="0"/>
-              <a:t>2/25/2020</a:t>
+              <a:t>10/12/2020</a:t>
             </a:fld>
             <a:endParaRPr lang="en-US"/>
           </a:p>
@@ -34157,7 +34128,15 @@
           <a:p>
             <a:r>
               <a:rPr lang="en-US" dirty="0" smtClean="0"/>
-              <a:t>Hy-Tech Club: C# 101</a:t>
+              <a:t>Hy-Tech Club: C</a:t>
+            </a:r>
+            <a:r>
+              <a:rPr lang="en-US" smtClean="0"/>
+              <a:t># </a:t>
+            </a:r>
+            <a:r>
+              <a:rPr lang="en-US" smtClean="0"/>
+              <a:t>102</a:t>
             </a:r>
             <a:endParaRPr lang="en-US" dirty="0"/>
           </a:p>
@@ -41950,11 +41929,7 @@
           <a:p>
             <a:r>
               <a:rPr lang="en-US" dirty="0" smtClean="0"/>
-              <a:t>Whiteboard Example </a:t>
-            </a:r>
-            <a:r>
-              <a:rPr lang="en-US" dirty="0" smtClean="0"/>
-              <a:t>Continued</a:t>
+              <a:t>Whiteboard Example Continued</a:t>
             </a:r>
             <a:endParaRPr lang="en-US" dirty="0"/>
           </a:p>
@@ -43073,15 +43048,6 @@
               </a:rPr>
               <a:t> loop like English</a:t>
             </a:r>
-            <a:endParaRPr lang="en-US" sz="3200" dirty="0" smtClean="0">
-              <a:solidFill>
-                <a:schemeClr val="accent2">
-                  <a:lumMod val="75000"/>
-                </a:schemeClr>
-              </a:solidFill>
-              <a:ea typeface="Segoe UI" pitchFamily="34" charset="0"/>
-              <a:cs typeface="Segoe UI" pitchFamily="34" charset="0"/>
-            </a:endParaRPr>
           </a:p>
         </p:txBody>
       </p:sp>
@@ -43259,15 +43225,7 @@
           <a:p>
             <a:r>
               <a:rPr lang="en-US" dirty="0" smtClean="0"/>
-              <a:t>Practice: </a:t>
-            </a:r>
-            <a:r>
-              <a:rPr lang="en-US" dirty="0" smtClean="0"/>
-              <a:t>Whiteboard </a:t>
-            </a:r>
-            <a:r>
-              <a:rPr lang="en-US" dirty="0" smtClean="0"/>
-              <a:t>Example</a:t>
+              <a:t>Practice: Whiteboard Example</a:t>
             </a:r>
             <a:endParaRPr lang="en-US" dirty="0"/>
           </a:p>

</xml_diff>